<commit_message>
preliminary CORE emulator environment generation
</commit_message>
<xml_diff>
--- a/resources/presentations/SIGCOMM/poster.pptx
+++ b/resources/presentations/SIGCOMM/poster.pptx
@@ -5300,7 +5300,6 @@
               <a:rPr lang="en-US" sz="1600" dirty="0" smtClean="0"/>
               <a:t>/pdf/200249.pdf.</a:t>
             </a:r>
-            <a:endParaRPr lang="en-US" sz="1600" dirty="0" smtClean="0"/>
           </a:p>
           <a:p>
             <a:pPr marL="434850" indent="-434850">
@@ -5331,7 +5330,6 @@
               <a:rPr lang="en-US" sz="1600" dirty="0" smtClean="0"/>
               <a:t>/courses/archive/fall10/cos561/papers/Yankee04.pdf.</a:t>
             </a:r>
-            <a:endParaRPr lang="en-US" sz="1600" dirty="0" smtClean="0"/>
           </a:p>
           <a:p>
             <a:pPr marL="434850" indent="-434850">
@@ -5378,7 +5376,6 @@
               <a:rPr lang="en-US" sz="1600" dirty="0"/>
               <a:t>. Extending SDN to large-scale networks. In Open Networking Summit, 2013.</a:t>
             </a:r>
-            <a:endParaRPr lang="en-US" sz="1600" dirty="0"/>
           </a:p>
           <a:p>
             <a:pPr marL="434850" indent="-434850">
@@ -5601,167 +5598,98 @@
               <a:rPr lang="en-US" sz="3000" dirty="0" smtClean="0">
                 <a:latin typeface="Calibri" pitchFamily="34" charset="0"/>
               </a:rPr>
-              <a:t>It </a:t>
-            </a:r>
+              <a:t>It is well known that traditional network configuration is highly error-prone [1,2,3]. </a:t>
+            </a:r>
+          </a:p>
+          <a:p>
+            <a:pPr eaLnBrk="1" hangingPunct="1"/>
             <a:r>
               <a:rPr lang="en-US" sz="3000" dirty="0" smtClean="0">
                 <a:latin typeface="Calibri" pitchFamily="34" charset="0"/>
               </a:rPr>
-              <a:t>is well known that traditional network configuration is highly error-prone [</a:t>
+              <a:t>Surveys of network operators often point to human error as a leading cause of misconfigurations [4,5]. </a:t>
+            </a:r>
+          </a:p>
+          <a:p>
+            <a:pPr eaLnBrk="1" hangingPunct="1"/>
+            <a:endParaRPr lang="en-US" sz="3000" dirty="0" smtClean="0">
+              <a:latin typeface="Calibri" pitchFamily="34" charset="0"/>
+            </a:endParaRPr>
+          </a:p>
+          <a:p>
+            <a:pPr eaLnBrk="1" hangingPunct="1"/>
+            <a:endParaRPr lang="en-US" sz="3000" dirty="0">
+              <a:latin typeface="Calibri" pitchFamily="34" charset="0"/>
+            </a:endParaRPr>
+          </a:p>
+          <a:p>
+            <a:pPr eaLnBrk="1" hangingPunct="1"/>
+            <a:endParaRPr lang="en-US" sz="3000" dirty="0" smtClean="0">
+              <a:latin typeface="Calibri" pitchFamily="34" charset="0"/>
+            </a:endParaRPr>
+          </a:p>
+          <a:p>
+            <a:pPr eaLnBrk="1" hangingPunct="1"/>
+            <a:endParaRPr lang="en-US" sz="3000" dirty="0">
+              <a:latin typeface="Calibri" pitchFamily="34" charset="0"/>
+            </a:endParaRPr>
+          </a:p>
+          <a:p>
+            <a:pPr eaLnBrk="1" hangingPunct="1"/>
+            <a:endParaRPr lang="en-US" sz="3000" dirty="0" smtClean="0">
+              <a:latin typeface="Calibri" pitchFamily="34" charset="0"/>
+            </a:endParaRPr>
+          </a:p>
+          <a:p>
+            <a:pPr eaLnBrk="1" hangingPunct="1"/>
+            <a:endParaRPr lang="en-US" sz="3000" dirty="0">
+              <a:latin typeface="Calibri" pitchFamily="34" charset="0"/>
+            </a:endParaRPr>
+          </a:p>
+          <a:p>
+            <a:pPr eaLnBrk="1" hangingPunct="1"/>
+            <a:endParaRPr lang="en-US" sz="3000" dirty="0" smtClean="0">
+              <a:latin typeface="Calibri" pitchFamily="34" charset="0"/>
+            </a:endParaRPr>
+          </a:p>
+          <a:p>
+            <a:pPr eaLnBrk="1" hangingPunct="1"/>
+            <a:endParaRPr lang="en-US" sz="3000" dirty="0" smtClean="0">
+              <a:latin typeface="Calibri" pitchFamily="34" charset="0"/>
+            </a:endParaRPr>
+          </a:p>
+          <a:p>
+            <a:pPr eaLnBrk="1" hangingPunct="1"/>
+            <a:endParaRPr lang="en-US" sz="3000" dirty="0">
+              <a:latin typeface="Calibri" pitchFamily="34" charset="0"/>
+            </a:endParaRPr>
+          </a:p>
+          <a:p>
+            <a:pPr eaLnBrk="1" hangingPunct="1"/>
+            <a:r>
+              <a:rPr lang="en-US" sz="3000" b="1" dirty="0" smtClean="0">
+                <a:latin typeface="Calibri" pitchFamily="34" charset="0"/>
+              </a:rPr>
+              <a:t>High-level Idea:</a:t>
             </a:r>
             <a:r>
               <a:rPr lang="en-US" sz="3000" dirty="0" smtClean="0">
                 <a:latin typeface="Calibri" pitchFamily="34" charset="0"/>
               </a:rPr>
-              <a:t>1,2,3]. </a:t>
-            </a:r>
-            <a:endParaRPr lang="en-US" sz="3000" dirty="0" smtClean="0">
-              <a:latin typeface="Calibri" pitchFamily="34" charset="0"/>
-            </a:endParaRPr>
-          </a:p>
-          <a:p>
-            <a:pPr eaLnBrk="1" hangingPunct="1"/>
+              <a:t> Traditional networks rely on distributed mechanisms to compute forwarding paths. This means they have many nice properties (e.g., scalability, latency), </a:t>
+            </a:r>
+            <a:r>
+              <a:rPr lang="en-US" sz="3000" dirty="0">
+                <a:latin typeface="Calibri" pitchFamily="34" charset="0"/>
+              </a:rPr>
+              <a:t>b</a:t>
+            </a:r>
             <a:r>
               <a:rPr lang="en-US" sz="3000" dirty="0" smtClean="0">
                 <a:latin typeface="Calibri" pitchFamily="34" charset="0"/>
               </a:rPr>
-              <a:t>Surveys of network operators often point to human error as a leading cause of </a:t>
-            </a:r>
-            <a:r>
-              <a:rPr lang="en-US" sz="3000" dirty="0" smtClean="0">
-                <a:latin typeface="Calibri" pitchFamily="34" charset="0"/>
-              </a:rPr>
-              <a:t>misconfigurations [4,5]. </a:t>
-            </a:r>
-            <a:endParaRPr lang="en-US" sz="3000" dirty="0" smtClean="0">
-              <a:latin typeface="Calibri" pitchFamily="34" charset="0"/>
-            </a:endParaRPr>
-          </a:p>
-          <a:p>
-            <a:pPr eaLnBrk="1" hangingPunct="1"/>
-            <a:endParaRPr lang="en-US" sz="3000" dirty="0" smtClean="0">
-              <a:latin typeface="Calibri" pitchFamily="34" charset="0"/>
-            </a:endParaRPr>
-          </a:p>
-          <a:p>
-            <a:pPr eaLnBrk="1" hangingPunct="1"/>
-            <a:endParaRPr lang="en-US" sz="3000" dirty="0">
-              <a:latin typeface="Calibri" pitchFamily="34" charset="0"/>
-            </a:endParaRPr>
-          </a:p>
-          <a:p>
-            <a:pPr eaLnBrk="1" hangingPunct="1"/>
-            <a:endParaRPr lang="en-US" sz="3000" dirty="0" smtClean="0">
-              <a:latin typeface="Calibri" pitchFamily="34" charset="0"/>
-            </a:endParaRPr>
-          </a:p>
-          <a:p>
-            <a:pPr eaLnBrk="1" hangingPunct="1"/>
-            <a:endParaRPr lang="en-US" sz="3000" dirty="0">
-              <a:latin typeface="Calibri" pitchFamily="34" charset="0"/>
-            </a:endParaRPr>
-          </a:p>
-          <a:p>
-            <a:pPr eaLnBrk="1" hangingPunct="1"/>
-            <a:endParaRPr lang="en-US" sz="3000" dirty="0" smtClean="0">
-              <a:latin typeface="Calibri" pitchFamily="34" charset="0"/>
-            </a:endParaRPr>
-          </a:p>
-          <a:p>
-            <a:pPr eaLnBrk="1" hangingPunct="1"/>
-            <a:endParaRPr lang="en-US" sz="3000" dirty="0">
-              <a:latin typeface="Calibri" pitchFamily="34" charset="0"/>
-            </a:endParaRPr>
-          </a:p>
-          <a:p>
-            <a:pPr eaLnBrk="1" hangingPunct="1"/>
-            <a:endParaRPr lang="en-US" sz="3000" dirty="0" smtClean="0">
-              <a:latin typeface="Calibri" pitchFamily="34" charset="0"/>
-            </a:endParaRPr>
-          </a:p>
-          <a:p>
-            <a:pPr eaLnBrk="1" hangingPunct="1"/>
-            <a:endParaRPr lang="en-US" sz="3000" dirty="0" smtClean="0">
-              <a:latin typeface="Calibri" pitchFamily="34" charset="0"/>
-            </a:endParaRPr>
-          </a:p>
-          <a:p>
-            <a:pPr eaLnBrk="1" hangingPunct="1"/>
-            <a:endParaRPr lang="en-US" sz="3000" dirty="0">
-              <a:latin typeface="Calibri" pitchFamily="34" charset="0"/>
-            </a:endParaRPr>
-          </a:p>
-          <a:p>
-            <a:pPr eaLnBrk="1" hangingPunct="1"/>
-            <a:r>
-              <a:rPr lang="en-US" sz="3000" b="1" dirty="0" smtClean="0">
-                <a:latin typeface="Calibri" pitchFamily="34" charset="0"/>
-              </a:rPr>
-              <a:t>High-level Idea:</a:t>
-            </a:r>
-            <a:r>
-              <a:rPr lang="en-US" sz="3000" dirty="0" smtClean="0">
-                <a:latin typeface="Calibri" pitchFamily="34" charset="0"/>
-              </a:rPr>
-              <a:t> Traditional networks rely on distributed mechanisms to compute forwarding paths. </a:t>
-            </a:r>
-            <a:r>
-              <a:rPr lang="en-US" sz="3000" dirty="0" smtClean="0">
-                <a:latin typeface="Calibri" pitchFamily="34" charset="0"/>
-              </a:rPr>
-              <a:t>This means they have </a:t>
-            </a:r>
-            <a:r>
-              <a:rPr lang="en-US" sz="3000" dirty="0" smtClean="0">
-                <a:latin typeface="Calibri" pitchFamily="34" charset="0"/>
-              </a:rPr>
-              <a:t>many nice properties (e.g., scalability, latency</a:t>
-            </a:r>
-            <a:r>
-              <a:rPr lang="en-US" sz="3000" dirty="0" smtClean="0">
-                <a:latin typeface="Calibri" pitchFamily="34" charset="0"/>
-              </a:rPr>
-              <a:t>), </a:t>
-            </a:r>
-            <a:r>
-              <a:rPr lang="en-US" sz="3000" dirty="0">
-                <a:latin typeface="Calibri" pitchFamily="34" charset="0"/>
-              </a:rPr>
-              <a:t>b</a:t>
-            </a:r>
-            <a:r>
-              <a:rPr lang="en-US" sz="3000" dirty="0" smtClean="0">
-                <a:latin typeface="Calibri" pitchFamily="34" charset="0"/>
-              </a:rPr>
-              <a:t>ut </a:t>
-            </a:r>
-            <a:r>
-              <a:rPr lang="en-US" sz="3000" dirty="0" smtClean="0">
-                <a:latin typeface="Calibri" pitchFamily="34" charset="0"/>
-              </a:rPr>
-              <a:t>configuration is hard because it involves distributed </a:t>
-            </a:r>
-            <a:r>
-              <a:rPr lang="en-US" sz="3000" dirty="0" smtClean="0">
-                <a:latin typeface="Calibri" pitchFamily="34" charset="0"/>
-              </a:rPr>
-              <a:t>programming (a configuration for each device). </a:t>
-            </a:r>
-            <a:r>
-              <a:rPr lang="en-US" sz="3000" dirty="0" smtClean="0">
-                <a:latin typeface="Calibri" pitchFamily="34" charset="0"/>
-              </a:rPr>
-              <a:t>SDN simplifies configuration but this comes at </a:t>
-            </a:r>
-            <a:r>
-              <a:rPr lang="en-US" sz="3000" dirty="0" smtClean="0">
-                <a:latin typeface="Calibri" pitchFamily="34" charset="0"/>
-              </a:rPr>
-              <a:t>the cost of many such properties [6,7].</a:t>
-            </a:r>
-            <a:endParaRPr lang="en-US" sz="3000" dirty="0" smtClean="0">
-              <a:latin typeface="Calibri" pitchFamily="34" charset="0"/>
-            </a:endParaRPr>
+              <a:t>ut configuration is hard because it involves distributed programming (a configuration for each device). SDN simplifies configuration but this comes at the cost of many such properties [6,7].</a:t>
+            </a:r>
           </a:p>
           <a:p>
             <a:pPr eaLnBrk="1" hangingPunct="1"/>
@@ -6098,13 +6026,7 @@
               <a:rPr lang="en-US" sz="3000" b="1" dirty="0" smtClean="0">
                 <a:latin typeface="Calibri" pitchFamily="34" charset="0"/>
               </a:rPr>
-              <a:t>Compilation </a:t>
-            </a:r>
-            <a:r>
-              <a:rPr lang="en-US" sz="3000" b="1" dirty="0" smtClean="0">
-                <a:latin typeface="Calibri" pitchFamily="34" charset="0"/>
-              </a:rPr>
-              <a:t>Stages:</a:t>
+              <a:t>Compilation Stages:</a:t>
             </a:r>
           </a:p>
           <a:p>
@@ -6320,13 +6242,7 @@
               <a:rPr lang="en-US" sz="3000" b="1" dirty="0" smtClean="0">
                 <a:latin typeface="Calibri" pitchFamily="34" charset="0"/>
               </a:rPr>
-              <a:t>Product </a:t>
-            </a:r>
-            <a:r>
-              <a:rPr lang="en-US" sz="3000" b="1" dirty="0" smtClean="0">
-                <a:latin typeface="Calibri" pitchFamily="34" charset="0"/>
-              </a:rPr>
-              <a:t>Graph:</a:t>
+              <a:t>Product Graph:</a:t>
             </a:r>
           </a:p>
           <a:p>
@@ -7216,13 +7132,7 @@
               <a:rPr lang="en-US" sz="3000" b="1" dirty="0" smtClean="0">
                 <a:latin typeface="Calibri" pitchFamily="34" charset="0"/>
               </a:rPr>
-              <a:t>Compiler</a:t>
-            </a:r>
-            <a:r>
-              <a:rPr lang="en-US" sz="3000" b="1" dirty="0" smtClean="0">
-                <a:latin typeface="Calibri" pitchFamily="34" charset="0"/>
-              </a:rPr>
-              <a:t>:</a:t>
+              <a:t>Compiler:</a:t>
             </a:r>
           </a:p>
           <a:p>
@@ -7992,13 +7902,7 @@
               <a:rPr lang="en-US" sz="2400" dirty="0" smtClean="0">
                 <a:latin typeface="Calibri" pitchFamily="34" charset="0"/>
               </a:rPr>
-              <a:t> Operator survey on network misconfiguration causes </a:t>
-            </a:r>
-            <a:r>
-              <a:rPr lang="en-US" sz="2400" dirty="0" smtClean="0">
-                <a:latin typeface="Calibri" pitchFamily="34" charset="0"/>
-              </a:rPr>
-              <a:t>[4,5]</a:t>
+              <a:t> Operator survey on network misconfiguration causes [4,5]</a:t>
             </a:r>
             <a:endParaRPr lang="en-US" sz="2400" dirty="0">
               <a:latin typeface="Calibri" pitchFamily="34" charset="0"/>
@@ -8201,13 +8105,7 @@
               <a:rPr lang="en-US" sz="3000" b="1" dirty="0" smtClean="0">
                 <a:latin typeface="Calibri" pitchFamily="34" charset="0"/>
               </a:rPr>
-              <a:t>Programming </a:t>
-            </a:r>
-            <a:r>
-              <a:rPr lang="en-US" sz="3000" b="1" dirty="0" smtClean="0">
-                <a:latin typeface="Calibri" pitchFamily="34" charset="0"/>
-              </a:rPr>
-              <a:t>Model:</a:t>
+              <a:t>Programming Model:</a:t>
             </a:r>
           </a:p>
           <a:p>

</xml_diff>

<commit_message>
Don't add newline to graphviz format
</commit_message>
<xml_diff>
--- a/resources/presentations/SIGCOMM/poster.pptx
+++ b/resources/presentations/SIGCOMM/poster.pptx
@@ -254,7 +254,7 @@
           <a:p>
             <a:fld id="{985D6BDF-9D0E-4E2B-85B8-D8F4790360C9}" type="datetimeFigureOut">
               <a:rPr lang="en-US" smtClean="0"/>
-              <a:t>8/10/16</a:t>
+              <a:t>3/21/17</a:t>
             </a:fld>
             <a:endParaRPr lang="en-US" dirty="0"/>
           </a:p>
@@ -424,7 +424,7 @@
           <a:p>
             <a:fld id="{985D6BDF-9D0E-4E2B-85B8-D8F4790360C9}" type="datetimeFigureOut">
               <a:rPr lang="en-US" smtClean="0"/>
-              <a:t>8/10/16</a:t>
+              <a:t>3/21/17</a:t>
             </a:fld>
             <a:endParaRPr lang="en-US" dirty="0"/>
           </a:p>
@@ -604,7 +604,7 @@
           <a:p>
             <a:fld id="{985D6BDF-9D0E-4E2B-85B8-D8F4790360C9}" type="datetimeFigureOut">
               <a:rPr lang="en-US" smtClean="0"/>
-              <a:t>8/10/16</a:t>
+              <a:t>3/21/17</a:t>
             </a:fld>
             <a:endParaRPr lang="en-US" dirty="0"/>
           </a:p>
@@ -2264,7 +2264,7 @@
           <a:p>
             <a:fld id="{985D6BDF-9D0E-4E2B-85B8-D8F4790360C9}" type="datetimeFigureOut">
               <a:rPr lang="en-US" smtClean="0"/>
-              <a:t>8/10/16</a:t>
+              <a:t>3/21/17</a:t>
             </a:fld>
             <a:endParaRPr lang="en-US" dirty="0"/>
           </a:p>
@@ -2510,7 +2510,7 @@
           <a:p>
             <a:fld id="{985D6BDF-9D0E-4E2B-85B8-D8F4790360C9}" type="datetimeFigureOut">
               <a:rPr lang="en-US" smtClean="0"/>
-              <a:t>8/10/16</a:t>
+              <a:t>3/21/17</a:t>
             </a:fld>
             <a:endParaRPr lang="en-US" dirty="0"/>
           </a:p>
@@ -2742,7 +2742,7 @@
           <a:p>
             <a:fld id="{985D6BDF-9D0E-4E2B-85B8-D8F4790360C9}" type="datetimeFigureOut">
               <a:rPr lang="en-US" smtClean="0"/>
-              <a:t>8/10/16</a:t>
+              <a:t>3/21/17</a:t>
             </a:fld>
             <a:endParaRPr lang="en-US" dirty="0"/>
           </a:p>
@@ -3114,7 +3114,7 @@
           <a:p>
             <a:fld id="{985D6BDF-9D0E-4E2B-85B8-D8F4790360C9}" type="datetimeFigureOut">
               <a:rPr lang="en-US" smtClean="0"/>
-              <a:t>8/10/16</a:t>
+              <a:t>3/21/17</a:t>
             </a:fld>
             <a:endParaRPr lang="en-US" dirty="0"/>
           </a:p>
@@ -3237,7 +3237,7 @@
           <a:p>
             <a:fld id="{985D6BDF-9D0E-4E2B-85B8-D8F4790360C9}" type="datetimeFigureOut">
               <a:rPr lang="en-US" smtClean="0"/>
-              <a:t>8/10/16</a:t>
+              <a:t>3/21/17</a:t>
             </a:fld>
             <a:endParaRPr lang="en-US" dirty="0"/>
           </a:p>
@@ -3332,7 +3332,7 @@
           <a:p>
             <a:fld id="{985D6BDF-9D0E-4E2B-85B8-D8F4790360C9}" type="datetimeFigureOut">
               <a:rPr lang="en-US" smtClean="0"/>
-              <a:t>8/10/16</a:t>
+              <a:t>3/21/17</a:t>
             </a:fld>
             <a:endParaRPr lang="en-US" dirty="0"/>
           </a:p>
@@ -3609,7 +3609,7 @@
           <a:p>
             <a:fld id="{985D6BDF-9D0E-4E2B-85B8-D8F4790360C9}" type="datetimeFigureOut">
               <a:rPr lang="en-US" smtClean="0"/>
-              <a:t>8/10/16</a:t>
+              <a:t>3/21/17</a:t>
             </a:fld>
             <a:endParaRPr lang="en-US" dirty="0"/>
           </a:p>
@@ -3867,7 +3867,7 @@
           <a:p>
             <a:fld id="{985D6BDF-9D0E-4E2B-85B8-D8F4790360C9}" type="datetimeFigureOut">
               <a:rPr lang="en-US" smtClean="0"/>
-              <a:t>8/10/16</a:t>
+              <a:t>3/21/17</a:t>
             </a:fld>
             <a:endParaRPr lang="en-US" dirty="0"/>
           </a:p>
@@ -4085,7 +4085,7 @@
           <a:p>
             <a:fld id="{985D6BDF-9D0E-4E2B-85B8-D8F4790360C9}" type="datetimeFigureOut">
               <a:rPr lang="en-US" smtClean="0"/>
-              <a:t>8/10/16</a:t>
+              <a:t>3/21/17</a:t>
             </a:fld>
             <a:endParaRPr lang="en-US" dirty="0"/>
           </a:p>
@@ -6044,7 +6044,25 @@
               <a:rPr lang="en-US" sz="3000" dirty="0" smtClean="0">
                 <a:latin typeface="Calibri" pitchFamily="34" charset="0"/>
               </a:rPr>
-              <a:t>Compile Propane to per-destination state machines that associate paths with ranks. A lower rank means the path is preferred.</a:t>
+              <a:t>Compile Propane to per-destination </a:t>
+            </a:r>
+            <a:r>
+              <a:rPr lang="en-US" sz="3000" smtClean="0">
+                <a:latin typeface="Calibri" pitchFamily="34" charset="0"/>
+              </a:rPr>
+              <a:t>state </a:t>
+            </a:r>
+            <a:r>
+              <a:rPr lang="en-US" sz="3000" smtClean="0">
+                <a:latin typeface="Calibri" pitchFamily="34" charset="0"/>
+              </a:rPr>
+              <a:t>machines that </a:t>
+            </a:r>
+            <a:r>
+              <a:rPr lang="en-US" sz="3000" dirty="0" smtClean="0">
+                <a:latin typeface="Calibri" pitchFamily="34" charset="0"/>
+              </a:rPr>
+              <a:t>associate paths with ranks. A lower rank means the path is preferred.</a:t>
             </a:r>
           </a:p>
           <a:p>

</xml_diff>